<commit_message>
fixed survey qr code
</commit_message>
<xml_diff>
--- a/Event Materials/Speaker/GPPB2021 Speaker Template.pptx
+++ b/Event Materials/Speaker/GPPB2021 Speaker Template.pptx
@@ -2665,7 +2665,7 @@
           <a:p>
             <a:fld id="{E48EF238-771A-4086-BC2A-86F3ACCCAA59}" type="datetimeFigureOut">
               <a:rPr lang="en-US" smtClean="0"/>
-              <a:t>2/5/2021</a:t>
+              <a:t>2/16/2021</a:t>
             </a:fld>
             <a:endParaRPr lang="en-US"/>
           </a:p>
@@ -6806,6 +6806,222 @@
 </file>
 
 <file path=ppt/slideLayouts/slideLayout6.xml><?xml version="1.0" encoding="utf-8"?>
+<p:sldLayout xmlns:a="http://schemas.openxmlformats.org/drawingml/2006/main" xmlns:r="http://schemas.openxmlformats.org/officeDocument/2006/relationships" xmlns:p="http://schemas.openxmlformats.org/presentationml/2006/main" preserve="1" userDrawn="1">
+  <p:cSld name="2_End Slide">
+    <p:bg>
+      <p:bgPr>
+        <a:blipFill dpi="0" rotWithShape="1">
+          <a:blip r:embed="rId2">
+            <a:lum/>
+          </a:blip>
+          <a:srcRect/>
+          <a:stretch>
+            <a:fillRect l="-1000" r="-1000"/>
+          </a:stretch>
+        </a:blipFill>
+        <a:effectLst/>
+      </p:bgPr>
+    </p:bg>
+    <p:spTree>
+      <p:nvGrpSpPr>
+        <p:cNvPr id="1" name=""/>
+        <p:cNvGrpSpPr/>
+        <p:nvPr/>
+      </p:nvGrpSpPr>
+      <p:grpSpPr>
+        <a:xfrm>
+          <a:off x="0" y="0"/>
+          <a:ext cx="0" cy="0"/>
+          <a:chOff x="0" y="0"/>
+          <a:chExt cx="0" cy="0"/>
+        </a:xfrm>
+      </p:grpSpPr>
+      <p:pic>
+        <p:nvPicPr>
+          <p:cNvPr id="10" name="Picture 9" descr="A picture containing object&#10;&#10;Description generated with very high confidence" hidden="1">
+            <a:extLst>
+              <a:ext uri="{FF2B5EF4-FFF2-40B4-BE49-F238E27FC236}">
+                <a16:creationId xmlns:a16="http://schemas.microsoft.com/office/drawing/2014/main" id="{C47C373B-006A-4A1D-9787-B7B16330A14D}"/>
+              </a:ext>
+            </a:extLst>
+          </p:cNvPr>
+          <p:cNvPicPr>
+            <a:picLocks noChangeAspect="1"/>
+          </p:cNvPicPr>
+          <p:nvPr userDrawn="1"/>
+        </p:nvPicPr>
+        <p:blipFill>
+          <a:blip r:embed="rId3">
+            <a:extLst>
+              <a:ext uri="{28A0092B-C50C-407E-A947-70E740481C1C}">
+                <a14:useLocalDpi xmlns:a14="http://schemas.microsoft.com/office/drawing/2010/main" val="0"/>
+              </a:ext>
+            </a:extLst>
+          </a:blip>
+          <a:stretch>
+            <a:fillRect/>
+          </a:stretch>
+        </p:blipFill>
+        <p:spPr>
+          <a:xfrm>
+            <a:off x="828782" y="1774208"/>
+            <a:ext cx="10534436" cy="2111943"/>
+          </a:xfrm>
+          <a:prstGeom prst="rect">
+            <a:avLst/>
+          </a:prstGeom>
+        </p:spPr>
+      </p:pic>
+      <p:sp>
+        <p:nvSpPr>
+          <p:cNvPr id="2" name="Title 1">
+            <a:extLst>
+              <a:ext uri="{FF2B5EF4-FFF2-40B4-BE49-F238E27FC236}">
+                <a16:creationId xmlns:a16="http://schemas.microsoft.com/office/drawing/2014/main" id="{6E34E409-F9B0-49E9-813E-FDDDBA6960F6}"/>
+              </a:ext>
+            </a:extLst>
+          </p:cNvPr>
+          <p:cNvSpPr>
+            <a:spLocks noGrp="1"/>
+          </p:cNvSpPr>
+          <p:nvPr>
+            <p:ph type="title"/>
+          </p:nvPr>
+        </p:nvSpPr>
+        <p:spPr/>
+        <p:txBody>
+          <a:bodyPr/>
+          <a:lstStyle>
+            <a:lvl1pPr>
+              <a:defRPr>
+                <a:solidFill>
+                  <a:schemeClr val="bg1"/>
+                </a:solidFill>
+              </a:defRPr>
+            </a:lvl1pPr>
+          </a:lstStyle>
+          <a:p>
+            <a:r>
+              <a:rPr lang="en-US" dirty="0"/>
+              <a:t>Click to edit Master title style</a:t>
+            </a:r>
+            <a:endParaRPr lang="en-CA" dirty="0"/>
+          </a:p>
+        </p:txBody>
+      </p:sp>
+      <p:sp>
+        <p:nvSpPr>
+          <p:cNvPr id="4" name="Content Placeholder 3">
+            <a:extLst>
+              <a:ext uri="{FF2B5EF4-FFF2-40B4-BE49-F238E27FC236}">
+                <a16:creationId xmlns:a16="http://schemas.microsoft.com/office/drawing/2014/main" id="{B151D63C-DCEB-4E61-8744-18831BE37689}"/>
+              </a:ext>
+            </a:extLst>
+          </p:cNvPr>
+          <p:cNvSpPr>
+            <a:spLocks noGrp="1"/>
+          </p:cNvSpPr>
+          <p:nvPr>
+            <p:ph sz="quarter" idx="10"/>
+          </p:nvPr>
+        </p:nvSpPr>
+        <p:spPr>
+          <a:xfrm>
+            <a:off x="838200" y="1903413"/>
+            <a:ext cx="10515600" cy="3657600"/>
+          </a:xfrm>
+        </p:spPr>
+        <p:txBody>
+          <a:bodyPr/>
+          <a:lstStyle>
+            <a:lvl1pPr>
+              <a:defRPr>
+                <a:solidFill>
+                  <a:schemeClr val="bg1"/>
+                </a:solidFill>
+              </a:defRPr>
+            </a:lvl1pPr>
+            <a:lvl2pPr>
+              <a:defRPr>
+                <a:solidFill>
+                  <a:schemeClr val="bg1"/>
+                </a:solidFill>
+              </a:defRPr>
+            </a:lvl2pPr>
+            <a:lvl3pPr>
+              <a:defRPr>
+                <a:solidFill>
+                  <a:schemeClr val="bg1"/>
+                </a:solidFill>
+              </a:defRPr>
+            </a:lvl3pPr>
+            <a:lvl4pPr>
+              <a:defRPr>
+                <a:solidFill>
+                  <a:schemeClr val="bg1"/>
+                </a:solidFill>
+              </a:defRPr>
+            </a:lvl4pPr>
+            <a:lvl5pPr>
+              <a:defRPr>
+                <a:solidFill>
+                  <a:schemeClr val="bg1"/>
+                </a:solidFill>
+              </a:defRPr>
+            </a:lvl5pPr>
+          </a:lstStyle>
+          <a:p>
+            <a:pPr lvl="0"/>
+            <a:r>
+              <a:rPr lang="en-US" dirty="0"/>
+              <a:t>Edit Master text styles</a:t>
+            </a:r>
+          </a:p>
+          <a:p>
+            <a:pPr lvl="1"/>
+            <a:r>
+              <a:rPr lang="en-US" dirty="0"/>
+              <a:t>Second level</a:t>
+            </a:r>
+          </a:p>
+          <a:p>
+            <a:pPr lvl="2"/>
+            <a:r>
+              <a:rPr lang="en-US" dirty="0"/>
+              <a:t>Third level</a:t>
+            </a:r>
+          </a:p>
+          <a:p>
+            <a:pPr lvl="3"/>
+            <a:r>
+              <a:rPr lang="en-US" dirty="0"/>
+              <a:t>Fourth level</a:t>
+            </a:r>
+          </a:p>
+          <a:p>
+            <a:pPr lvl="4"/>
+            <a:r>
+              <a:rPr lang="en-US" dirty="0"/>
+              <a:t>Fifth level</a:t>
+            </a:r>
+            <a:endParaRPr lang="en-CA" dirty="0"/>
+          </a:p>
+        </p:txBody>
+      </p:sp>
+    </p:spTree>
+    <p:extLst>
+      <p:ext uri="{BB962C8B-B14F-4D97-AF65-F5344CB8AC3E}">
+        <p14:creationId xmlns:p14="http://schemas.microsoft.com/office/powerpoint/2010/main" val="4224977934"/>
+      </p:ext>
+    </p:extLst>
+  </p:cSld>
+  <p:clrMapOvr>
+    <a:overrideClrMapping bg1="lt1" tx1="dk1" bg2="lt2" tx2="dk2" accent1="accent1" accent2="accent2" accent3="accent3" accent4="accent4" accent5="accent5" accent6="accent6" hlink="hlink" folHlink="folHlink"/>
+  </p:clrMapOvr>
+</p:sldLayout>
+</file>
+
+<file path=ppt/slideLayouts/slideLayout7.xml><?xml version="1.0" encoding="utf-8"?>
 <p:sldLayout xmlns:a="http://schemas.openxmlformats.org/drawingml/2006/main" xmlns:r="http://schemas.openxmlformats.org/officeDocument/2006/relationships" xmlns:p="http://schemas.openxmlformats.org/presentationml/2006/main" type="twoObj" preserve="1">
   <p:cSld name="Two Content">
     <p:bg>
@@ -6983,340 +7199,6 @@
     <p:extLst>
       <p:ext uri="{BB962C8B-B14F-4D97-AF65-F5344CB8AC3E}">
         <p14:creationId xmlns:p14="http://schemas.microsoft.com/office/powerpoint/2010/main" val="170030985"/>
-      </p:ext>
-    </p:extLst>
-  </p:cSld>
-  <p:clrMapOvr>
-    <a:overrideClrMapping bg1="lt1" tx1="dk1" bg2="lt2" tx2="dk2" accent1="accent1" accent2="accent2" accent3="accent3" accent4="accent4" accent5="accent5" accent6="accent6" hlink="hlink" folHlink="folHlink"/>
-  </p:clrMapOvr>
-</p:sldLayout>
-</file>
-
-<file path=ppt/slideLayouts/slideLayout7.xml><?xml version="1.0" encoding="utf-8"?>
-<p:sldLayout xmlns:a="http://schemas.openxmlformats.org/drawingml/2006/main" xmlns:r="http://schemas.openxmlformats.org/officeDocument/2006/relationships" xmlns:p="http://schemas.openxmlformats.org/presentationml/2006/main" type="twoTxTwoObj" preserve="1">
-  <p:cSld name="Comparison">
-    <p:bg>
-      <p:bgRef idx="1003">
-        <a:schemeClr val="bg2"/>
-      </p:bgRef>
-    </p:bg>
-    <p:spTree>
-      <p:nvGrpSpPr>
-        <p:cNvPr id="1" name=""/>
-        <p:cNvGrpSpPr/>
-        <p:nvPr/>
-      </p:nvGrpSpPr>
-      <p:grpSpPr>
-        <a:xfrm>
-          <a:off x="0" y="0"/>
-          <a:ext cx="0" cy="0"/>
-          <a:chOff x="0" y="0"/>
-          <a:chExt cx="0" cy="0"/>
-        </a:xfrm>
-      </p:grpSpPr>
-      <p:sp>
-        <p:nvSpPr>
-          <p:cNvPr id="2" name="Title 1">
-            <a:extLst>
-              <a:ext uri="{FF2B5EF4-FFF2-40B4-BE49-F238E27FC236}">
-                <a16:creationId xmlns:a16="http://schemas.microsoft.com/office/drawing/2014/main" id="{D72ED121-9015-447A-BD23-A26434E9E81B}"/>
-              </a:ext>
-            </a:extLst>
-          </p:cNvPr>
-          <p:cNvSpPr>
-            <a:spLocks noGrp="1"/>
-          </p:cNvSpPr>
-          <p:nvPr>
-            <p:ph type="title"/>
-          </p:nvPr>
-        </p:nvSpPr>
-        <p:spPr>
-          <a:xfrm>
-            <a:off x="839788" y="365125"/>
-            <a:ext cx="10515600" cy="1030043"/>
-          </a:xfrm>
-        </p:spPr>
-        <p:txBody>
-          <a:bodyPr/>
-          <a:lstStyle/>
-          <a:p>
-            <a:r>
-              <a:rPr lang="en-US"/>
-              <a:t>Click to edit Master title style</a:t>
-            </a:r>
-          </a:p>
-        </p:txBody>
-      </p:sp>
-      <p:sp>
-        <p:nvSpPr>
-          <p:cNvPr id="3" name="Text Placeholder 2">
-            <a:extLst>
-              <a:ext uri="{FF2B5EF4-FFF2-40B4-BE49-F238E27FC236}">
-                <a16:creationId xmlns:a16="http://schemas.microsoft.com/office/drawing/2014/main" id="{2E28B377-9DF4-4D81-B90C-EDC75C5399A7}"/>
-              </a:ext>
-            </a:extLst>
-          </p:cNvPr>
-          <p:cNvSpPr>
-            <a:spLocks noGrp="1"/>
-          </p:cNvSpPr>
-          <p:nvPr>
-            <p:ph type="body" idx="1"/>
-          </p:nvPr>
-        </p:nvSpPr>
-        <p:spPr>
-          <a:xfrm>
-            <a:off x="838200" y="1456540"/>
-            <a:ext cx="5157787" cy="823912"/>
-          </a:xfrm>
-        </p:spPr>
-        <p:txBody>
-          <a:bodyPr anchor="b"/>
-          <a:lstStyle>
-            <a:lvl1pPr marL="0" indent="0">
-              <a:buNone/>
-              <a:defRPr sz="2400" b="1"/>
-            </a:lvl1pPr>
-            <a:lvl2pPr marL="457200" indent="0">
-              <a:buNone/>
-              <a:defRPr sz="2000" b="1"/>
-            </a:lvl2pPr>
-            <a:lvl3pPr marL="914400" indent="0">
-              <a:buNone/>
-              <a:defRPr sz="1800" b="1"/>
-            </a:lvl3pPr>
-            <a:lvl4pPr marL="1371600" indent="0">
-              <a:buNone/>
-              <a:defRPr sz="1600" b="1"/>
-            </a:lvl4pPr>
-            <a:lvl5pPr marL="1828800" indent="0">
-              <a:buNone/>
-              <a:defRPr sz="1600" b="1"/>
-            </a:lvl5pPr>
-            <a:lvl6pPr marL="2286000" indent="0">
-              <a:buNone/>
-              <a:defRPr sz="1600" b="1"/>
-            </a:lvl6pPr>
-            <a:lvl7pPr marL="2743200" indent="0">
-              <a:buNone/>
-              <a:defRPr sz="1600" b="1"/>
-            </a:lvl7pPr>
-            <a:lvl8pPr marL="3200400" indent="0">
-              <a:buNone/>
-              <a:defRPr sz="1600" b="1"/>
-            </a:lvl8pPr>
-            <a:lvl9pPr marL="3657600" indent="0">
-              <a:buNone/>
-              <a:defRPr sz="1600" b="1"/>
-            </a:lvl9pPr>
-          </a:lstStyle>
-          <a:p>
-            <a:pPr lvl="0"/>
-            <a:r>
-              <a:rPr lang="en-US" dirty="0"/>
-              <a:t>Edit Master text styles</a:t>
-            </a:r>
-          </a:p>
-        </p:txBody>
-      </p:sp>
-      <p:sp>
-        <p:nvSpPr>
-          <p:cNvPr id="4" name="Content Placeholder 3">
-            <a:extLst>
-              <a:ext uri="{FF2B5EF4-FFF2-40B4-BE49-F238E27FC236}">
-                <a16:creationId xmlns:a16="http://schemas.microsoft.com/office/drawing/2014/main" id="{A27423A1-1CC8-47F2-A923-8D6C8C1373BD}"/>
-              </a:ext>
-            </a:extLst>
-          </p:cNvPr>
-          <p:cNvSpPr>
-            <a:spLocks noGrp="1"/>
-          </p:cNvSpPr>
-          <p:nvPr>
-            <p:ph sz="half" idx="2"/>
-          </p:nvPr>
-        </p:nvSpPr>
-        <p:spPr>
-          <a:xfrm>
-            <a:off x="788018" y="2280452"/>
-            <a:ext cx="5232033" cy="3566895"/>
-          </a:xfrm>
-        </p:spPr>
-        <p:txBody>
-          <a:bodyPr/>
-          <a:lstStyle/>
-          <a:p>
-            <a:pPr lvl="0"/>
-            <a:r>
-              <a:rPr lang="en-US"/>
-              <a:t>Edit Master text styles</a:t>
-            </a:r>
-          </a:p>
-          <a:p>
-            <a:pPr lvl="1"/>
-            <a:r>
-              <a:rPr lang="en-US"/>
-              <a:t>Second level</a:t>
-            </a:r>
-          </a:p>
-          <a:p>
-            <a:pPr lvl="2"/>
-            <a:r>
-              <a:rPr lang="en-US"/>
-              <a:t>Third level</a:t>
-            </a:r>
-          </a:p>
-          <a:p>
-            <a:pPr lvl="3"/>
-            <a:r>
-              <a:rPr lang="en-US"/>
-              <a:t>Fourth level</a:t>
-            </a:r>
-          </a:p>
-          <a:p>
-            <a:pPr lvl="4"/>
-            <a:r>
-              <a:rPr lang="en-US"/>
-              <a:t>Fifth level</a:t>
-            </a:r>
-          </a:p>
-        </p:txBody>
-      </p:sp>
-      <p:sp>
-        <p:nvSpPr>
-          <p:cNvPr id="5" name="Text Placeholder 4">
-            <a:extLst>
-              <a:ext uri="{FF2B5EF4-FFF2-40B4-BE49-F238E27FC236}">
-                <a16:creationId xmlns:a16="http://schemas.microsoft.com/office/drawing/2014/main" id="{582B12BD-B677-4067-B39E-D346B7D0629C}"/>
-              </a:ext>
-            </a:extLst>
-          </p:cNvPr>
-          <p:cNvSpPr>
-            <a:spLocks noGrp="1"/>
-          </p:cNvSpPr>
-          <p:nvPr>
-            <p:ph type="body" sz="quarter" idx="3"/>
-          </p:nvPr>
-        </p:nvSpPr>
-        <p:spPr>
-          <a:xfrm>
-            <a:off x="6170612" y="1456540"/>
-            <a:ext cx="5183188" cy="823912"/>
-          </a:xfrm>
-        </p:spPr>
-        <p:txBody>
-          <a:bodyPr anchor="b"/>
-          <a:lstStyle>
-            <a:lvl1pPr marL="0" indent="0">
-              <a:buNone/>
-              <a:defRPr sz="2400" b="1"/>
-            </a:lvl1pPr>
-            <a:lvl2pPr marL="457200" indent="0">
-              <a:buNone/>
-              <a:defRPr sz="2000" b="1"/>
-            </a:lvl2pPr>
-            <a:lvl3pPr marL="914400" indent="0">
-              <a:buNone/>
-              <a:defRPr sz="1800" b="1"/>
-            </a:lvl3pPr>
-            <a:lvl4pPr marL="1371600" indent="0">
-              <a:buNone/>
-              <a:defRPr sz="1600" b="1"/>
-            </a:lvl4pPr>
-            <a:lvl5pPr marL="1828800" indent="0">
-              <a:buNone/>
-              <a:defRPr sz="1600" b="1"/>
-            </a:lvl5pPr>
-            <a:lvl6pPr marL="2286000" indent="0">
-              <a:buNone/>
-              <a:defRPr sz="1600" b="1"/>
-            </a:lvl6pPr>
-            <a:lvl7pPr marL="2743200" indent="0">
-              <a:buNone/>
-              <a:defRPr sz="1600" b="1"/>
-            </a:lvl7pPr>
-            <a:lvl8pPr marL="3200400" indent="0">
-              <a:buNone/>
-              <a:defRPr sz="1600" b="1"/>
-            </a:lvl8pPr>
-            <a:lvl9pPr marL="3657600" indent="0">
-              <a:buNone/>
-              <a:defRPr sz="1600" b="1"/>
-            </a:lvl9pPr>
-          </a:lstStyle>
-          <a:p>
-            <a:pPr lvl="0"/>
-            <a:r>
-              <a:rPr lang="en-US"/>
-              <a:t>Edit Master text styles</a:t>
-            </a:r>
-          </a:p>
-        </p:txBody>
-      </p:sp>
-      <p:sp>
-        <p:nvSpPr>
-          <p:cNvPr id="6" name="Content Placeholder 5">
-            <a:extLst>
-              <a:ext uri="{FF2B5EF4-FFF2-40B4-BE49-F238E27FC236}">
-                <a16:creationId xmlns:a16="http://schemas.microsoft.com/office/drawing/2014/main" id="{D769166E-FFC9-4082-A169-13F572B39BA5}"/>
-              </a:ext>
-            </a:extLst>
-          </p:cNvPr>
-          <p:cNvSpPr>
-            <a:spLocks noGrp="1"/>
-          </p:cNvSpPr>
-          <p:nvPr>
-            <p:ph sz="quarter" idx="4"/>
-          </p:nvPr>
-        </p:nvSpPr>
-        <p:spPr>
-          <a:xfrm>
-            <a:off x="6120064" y="2280452"/>
-            <a:ext cx="5257800" cy="3566895"/>
-          </a:xfrm>
-        </p:spPr>
-        <p:txBody>
-          <a:bodyPr/>
-          <a:lstStyle/>
-          <a:p>
-            <a:pPr lvl="0"/>
-            <a:r>
-              <a:rPr lang="en-US"/>
-              <a:t>Edit Master text styles</a:t>
-            </a:r>
-          </a:p>
-          <a:p>
-            <a:pPr lvl="1"/>
-            <a:r>
-              <a:rPr lang="en-US"/>
-              <a:t>Second level</a:t>
-            </a:r>
-          </a:p>
-          <a:p>
-            <a:pPr lvl="2"/>
-            <a:r>
-              <a:rPr lang="en-US"/>
-              <a:t>Third level</a:t>
-            </a:r>
-          </a:p>
-          <a:p>
-            <a:pPr lvl="3"/>
-            <a:r>
-              <a:rPr lang="en-US"/>
-              <a:t>Fourth level</a:t>
-            </a:r>
-          </a:p>
-          <a:p>
-            <a:pPr lvl="4"/>
-            <a:r>
-              <a:rPr lang="en-US"/>
-              <a:t>Fifth level</a:t>
-            </a:r>
-          </a:p>
-        </p:txBody>
-      </p:sp>
-    </p:spTree>
-    <p:extLst>
-      <p:ext uri="{BB962C8B-B14F-4D97-AF65-F5344CB8AC3E}">
-        <p14:creationId xmlns:p14="http://schemas.microsoft.com/office/powerpoint/2010/main" val="7028269"/>
       </p:ext>
     </p:extLst>
   </p:cSld>
@@ -7785,8 +7667,8 @@
     <p:sldLayoutId id="2147483677" r:id="rId3"/>
     <p:sldLayoutId id="2147483666" r:id="rId4"/>
     <p:sldLayoutId id="2147483679" r:id="rId5"/>
-    <p:sldLayoutId id="2147483652" r:id="rId6"/>
-    <p:sldLayoutId id="2147483653" r:id="rId7"/>
+    <p:sldLayoutId id="2147483680" r:id="rId6"/>
+    <p:sldLayoutId id="2147483652" r:id="rId7"/>
     <p:sldLayoutId id="2147483654" r:id="rId8"/>
     <p:sldLayoutId id="2147483655" r:id="rId9"/>
     <p:sldLayoutId id="2147483664" r:id="rId10"/>
@@ -8584,7 +8466,7 @@
 </file>
 
 <file path=ppt/slides/slide13.xml><?xml version="1.0" encoding="utf-8"?>
-<p:sld xmlns:a="http://schemas.openxmlformats.org/drawingml/2006/main" xmlns:r="http://schemas.openxmlformats.org/officeDocument/2006/relationships" xmlns:p="http://schemas.openxmlformats.org/presentationml/2006/main" show="0">
+<p:sld xmlns:a="http://schemas.openxmlformats.org/drawingml/2006/main" xmlns:r="http://schemas.openxmlformats.org/officeDocument/2006/relationships" xmlns:p="http://schemas.openxmlformats.org/presentationml/2006/main">
   <p:cSld>
     <p:spTree>
       <p:nvGrpSpPr>
@@ -9401,42 +9283,6 @@
           <a:chExt cx="0" cy="0"/>
         </a:xfrm>
       </p:grpSpPr>
-      <p:pic>
-        <p:nvPicPr>
-          <p:cNvPr id="2" name="Picture 1" descr="Qr code&#10;&#10;Description generated with very high confidence">
-            <a:extLst>
-              <a:ext uri="{FF2B5EF4-FFF2-40B4-BE49-F238E27FC236}">
-                <a16:creationId xmlns:a16="http://schemas.microsoft.com/office/drawing/2014/main" id="{80810219-9011-4084-BA0F-953F017E0FCF}"/>
-              </a:ext>
-            </a:extLst>
-          </p:cNvPr>
-          <p:cNvPicPr>
-            <a:picLocks noChangeAspect="1"/>
-          </p:cNvPicPr>
-          <p:nvPr/>
-        </p:nvPicPr>
-        <p:blipFill>
-          <a:blip r:embed="rId2">
-            <a:extLst>
-              <a:ext uri="{28A0092B-C50C-407E-A947-70E740481C1C}">
-                <a14:useLocalDpi xmlns:a14="http://schemas.microsoft.com/office/drawing/2010/main" val="0"/>
-              </a:ext>
-            </a:extLst>
-          </a:blip>
-          <a:stretch>
-            <a:fillRect/>
-          </a:stretch>
-        </p:blipFill>
-        <p:spPr>
-          <a:xfrm>
-            <a:off x="6943436" y="979055"/>
-            <a:ext cx="3606800" cy="3606800"/>
-          </a:xfrm>
-          <a:prstGeom prst="rect">
-            <a:avLst/>
-          </a:prstGeom>
-        </p:spPr>
-      </p:pic>
       <p:sp>
         <p:nvSpPr>
           <p:cNvPr id="4" name="TextBox 3">
@@ -9549,6 +9395,42 @@
           </a:p>
         </p:txBody>
       </p:sp>
+      <p:pic>
+        <p:nvPicPr>
+          <p:cNvPr id="6" name="Picture 5" descr="Qr code&#10;&#10;Description generated with very high confidence">
+            <a:extLst>
+              <a:ext uri="{FF2B5EF4-FFF2-40B4-BE49-F238E27FC236}">
+                <a16:creationId xmlns:a16="http://schemas.microsoft.com/office/drawing/2014/main" id="{9458906D-5C82-428C-A573-7A7252061B28}"/>
+              </a:ext>
+            </a:extLst>
+          </p:cNvPr>
+          <p:cNvPicPr>
+            <a:picLocks noChangeAspect="1"/>
+          </p:cNvPicPr>
+          <p:nvPr/>
+        </p:nvPicPr>
+        <p:blipFill>
+          <a:blip r:embed="rId2">
+            <a:extLst>
+              <a:ext uri="{28A0092B-C50C-407E-A947-70E740481C1C}">
+                <a14:useLocalDpi xmlns:a14="http://schemas.microsoft.com/office/drawing/2010/main" val="0"/>
+              </a:ext>
+            </a:extLst>
+          </a:blip>
+          <a:stretch>
+            <a:fillRect/>
+          </a:stretch>
+        </p:blipFill>
+        <p:spPr>
+          <a:xfrm>
+            <a:off x="6590251" y="794157"/>
+            <a:ext cx="3810000" cy="3810000"/>
+          </a:xfrm>
+          <a:prstGeom prst="rect">
+            <a:avLst/>
+          </a:prstGeom>
+        </p:spPr>
+      </p:pic>
     </p:spTree>
     <p:extLst>
       <p:ext uri="{BB962C8B-B14F-4D97-AF65-F5344CB8AC3E}">
@@ -9611,8 +9493,8 @@
         </p:nvSpPr>
         <p:spPr>
           <a:xfrm>
-            <a:off x="3153624" y="216406"/>
-            <a:ext cx="5884395" cy="919087"/>
+            <a:off x="494399" y="253728"/>
+            <a:ext cx="9899903" cy="919087"/>
           </a:xfrm>
         </p:spPr>
         <p:txBody>
@@ -9625,7 +9507,7 @@
               <a:rPr lang="en-CA" sz="4400" dirty="0"/>
               <a:t>Event Sponsors</a:t>
             </a:r>
-            <a:endParaRPr lang="en-US" sz="4400">
+            <a:endParaRPr lang="en-US" sz="4400" dirty="0">
               <a:solidFill>
                 <a:srgbClr val="732773"/>
               </a:solidFill>
@@ -14252,21 +14134,6 @@
 </file>
 
 <file path=customXml/item1.xml><?xml version="1.0" encoding="utf-8"?>
-<p:properties xmlns:p="http://schemas.microsoft.com/office/2006/metadata/properties" xmlns:xsi="http://www.w3.org/2001/XMLSchema-instance" xmlns:pc="http://schemas.microsoft.com/office/infopath/2007/PartnerControls">
-  <documentManagement/>
-</p:properties>
-</file>
-
-<file path=customXml/item2.xml><?xml version="1.0" encoding="utf-8"?>
-<?mso-contentType ?>
-<FormTemplates xmlns="http://schemas.microsoft.com/sharepoint/v3/contenttype/forms">
-  <Display>DocumentLibraryForm</Display>
-  <Edit>DocumentLibraryForm</Edit>
-  <New>DocumentLibraryForm</New>
-</FormTemplates>
-</file>
-
-<file path=customXml/item3.xml><?xml version="1.0" encoding="utf-8"?>
 <ct:contentTypeSchema xmlns:ct="http://schemas.microsoft.com/office/2006/metadata/contentType" xmlns:ma="http://schemas.microsoft.com/office/2006/metadata/properties/metaAttributes" ct:_="" ma:_="" ma:contentTypeName="Document" ma:contentTypeID="0x010100F6BDD08CCF370849A2D407B3E3FB0E50" ma:contentTypeVersion="6" ma:contentTypeDescription="Create a new document." ma:contentTypeScope="" ma:versionID="67b8d404d50ab64c6da975ce4eaec4ee">
   <xsd:schema xmlns:xsd="http://www.w3.org/2001/XMLSchema" xmlns:xs="http://www.w3.org/2001/XMLSchema" xmlns:p="http://schemas.microsoft.com/office/2006/metadata/properties" xmlns:ns2="774ed329-f2c8-4afb-9f87-f277f9430717" targetNamespace="http://schemas.microsoft.com/office/2006/metadata/properties" ma:root="true" ma:fieldsID="2ee7a84ba5c28d271e27e06945b3db8f" ns2:_="">
     <xsd:import namespace="774ed329-f2c8-4afb-9f87-f277f9430717"/>
@@ -14424,7 +14291,40 @@
 </ct:contentTypeSchema>
 </file>
 
+<file path=customXml/item2.xml><?xml version="1.0" encoding="utf-8"?>
+<p:properties xmlns:p="http://schemas.microsoft.com/office/2006/metadata/properties" xmlns:xsi="http://www.w3.org/2001/XMLSchema-instance" xmlns:pc="http://schemas.microsoft.com/office/infopath/2007/PartnerControls">
+  <documentManagement/>
+</p:properties>
+</file>
+
+<file path=customXml/item3.xml><?xml version="1.0" encoding="utf-8"?>
+<?mso-contentType ?>
+<FormTemplates xmlns="http://schemas.microsoft.com/sharepoint/v3/contenttype/forms">
+  <Display>DocumentLibraryForm</Display>
+  <Edit>DocumentLibraryForm</Edit>
+  <New>DocumentLibraryForm</New>
+</FormTemplates>
+</file>
+
 <file path=customXml/itemProps1.xml><?xml version="1.0" encoding="utf-8"?>
+<ds:datastoreItem xmlns:ds="http://schemas.openxmlformats.org/officeDocument/2006/customXml" ds:itemID="{216745AD-74D2-4BFB-8E5C-F0AF25631153}">
+  <ds:schemaRefs>
+    <ds:schemaRef ds:uri="http://schemas.microsoft.com/office/2006/metadata/contentType"/>
+    <ds:schemaRef ds:uri="http://schemas.microsoft.com/office/2006/metadata/properties/metaAttributes"/>
+    <ds:schemaRef ds:uri="http://www.w3.org/2001/XMLSchema"/>
+    <ds:schemaRef ds:uri="http://schemas.microsoft.com/office/2006/metadata/properties"/>
+    <ds:schemaRef ds:uri="774ed329-f2c8-4afb-9f87-f277f9430717"/>
+    <ds:schemaRef ds:uri="http://schemas.microsoft.com/office/2006/documentManagement/types"/>
+    <ds:schemaRef ds:uri="http://schemas.microsoft.com/office/infopath/2007/PartnerControls"/>
+    <ds:schemaRef ds:uri="http://schemas.openxmlformats.org/package/2006/metadata/core-properties"/>
+    <ds:schemaRef ds:uri="http://purl.org/dc/elements/1.1/"/>
+    <ds:schemaRef ds:uri="http://purl.org/dc/terms/"/>
+    <ds:schemaRef ds:uri="http://schemas.microsoft.com/internal/obd"/>
+  </ds:schemaRefs>
+</ds:datastoreItem>
+</file>
+
+<file path=customXml/itemProps2.xml><?xml version="1.0" encoding="utf-8"?>
 <ds:datastoreItem xmlns:ds="http://schemas.openxmlformats.org/officeDocument/2006/customXml" ds:itemID="{C4BD89D9-7255-4D5A-82E5-E966CAEE4330}">
   <ds:schemaRefs>
     <ds:schemaRef ds:uri="http://schemas.microsoft.com/office/2006/documentManagement/types"/>
@@ -14440,28 +14340,10 @@
 </ds:datastoreItem>
 </file>
 
-<file path=customXml/itemProps2.xml><?xml version="1.0" encoding="utf-8"?>
+<file path=customXml/itemProps3.xml><?xml version="1.0" encoding="utf-8"?>
 <ds:datastoreItem xmlns:ds="http://schemas.openxmlformats.org/officeDocument/2006/customXml" ds:itemID="{F011BBF7-1CE1-4050-9514-DB9AE0D56D7F}">
   <ds:schemaRefs>
     <ds:schemaRef ds:uri="http://schemas.microsoft.com/sharepoint/v3/contenttype/forms"/>
   </ds:schemaRefs>
 </ds:datastoreItem>
-</file>
-
-<file path=customXml/itemProps3.xml><?xml version="1.0" encoding="utf-8"?>
-<ds:datastoreItem xmlns:ds="http://schemas.openxmlformats.org/officeDocument/2006/customXml" ds:itemID="{216745AD-74D2-4BFB-8E5C-F0AF25631153}">
-  <ds:schemaRefs>
-    <ds:schemaRef ds:uri="http://schemas.microsoft.com/office/2006/metadata/contentType"/>
-    <ds:schemaRef ds:uri="http://schemas.microsoft.com/office/2006/metadata/properties/metaAttributes"/>
-    <ds:schemaRef ds:uri="http://www.w3.org/2001/XMLSchema"/>
-    <ds:schemaRef ds:uri="http://schemas.microsoft.com/office/2006/metadata/properties"/>
-    <ds:schemaRef ds:uri="774ed329-f2c8-4afb-9f87-f277f9430717"/>
-    <ds:schemaRef ds:uri="http://schemas.microsoft.com/office/2006/documentManagement/types"/>
-    <ds:schemaRef ds:uri="http://schemas.microsoft.com/office/infopath/2007/PartnerControls"/>
-    <ds:schemaRef ds:uri="http://schemas.openxmlformats.org/package/2006/metadata/core-properties"/>
-    <ds:schemaRef ds:uri="http://purl.org/dc/elements/1.1/"/>
-    <ds:schemaRef ds:uri="http://purl.org/dc/terms/"/>
-    <ds:schemaRef ds:uri="http://schemas.microsoft.com/internal/obd"/>
-  </ds:schemaRefs>
-</ds:datastoreItem>
 </file>
</xml_diff>